<commit_message>
AC losses included. Report: to be continued
</commit_message>
<xml_diff>
--- a/Presentations/4-Keysani_Sunum_Optimization_2023_10_10.pptx
+++ b/Presentations/4-Keysani_Sunum_Optimization_2023_10_10.pptx
@@ -282,7 +282,7 @@
               <a:pPr>
                 <a:defRPr/>
               </a:pPr>
-              <a:t>10/9/2023</a:t>
+              <a:t>10/25/2023</a:t>
             </a:fld>
             <a:endParaRPr lang="en-US"/>
           </a:p>
@@ -496,7 +496,7 @@
               <a:pPr>
                 <a:defRPr/>
               </a:pPr>
-              <a:t>10/9/2023</a:t>
+              <a:t>10/25/2023</a:t>
             </a:fld>
             <a:endParaRPr lang="en-US"/>
           </a:p>
@@ -5040,8 +5040,8 @@
           </a:p>
         </p:txBody>
       </p:sp>
-      <mc:AlternateContent xmlns:mc="http://schemas.openxmlformats.org/markup-compatibility/2006" xmlns:a14="http://schemas.microsoft.com/office/drawing/2010/main">
-        <mc:Choice Requires="a14">
+      <mc:AlternateContent xmlns:mc="http://schemas.openxmlformats.org/markup-compatibility/2006">
+        <mc:Choice xmlns:a14="http://schemas.microsoft.com/office/drawing/2010/main" Requires="a14">
           <p:sp>
             <p:nvSpPr>
               <p:cNvPr id="3" name="Content Placeholder 2">
@@ -5398,256 +5398,10 @@
                 <a:endParaRPr lang="tr-TR" dirty="0"/>
               </a:p>
               <a:p>
-                <a:pPr lvl="1" indent="0">
-                  <a:buNone/>
+                <a:pPr marL="982663" lvl="1" indent="-342900">
+                  <a:buFont typeface="Wingdings" panose="05000000000000000000" pitchFamily="2" charset="2"/>
+                  <a:buChar char="Ø"/>
                 </a:pPr>
-                <a14:m>
-                  <m:oMathPara xmlns:m="http://schemas.openxmlformats.org/officeDocument/2006/math">
-                    <m:oMathParaPr>
-                      <m:jc m:val="centerGroup"/>
-                    </m:oMathParaPr>
-                    <m:oMath xmlns:m="http://schemas.openxmlformats.org/officeDocument/2006/math">
-                      <m:sSub>
-                        <m:sSubPr>
-                          <m:ctrlPr>
-                            <a:rPr lang="tr-TR" b="0" i="1" smtClean="0">
-                              <a:latin typeface="Cambria Math" panose="02040503050406030204" pitchFamily="18" charset="0"/>
-                            </a:rPr>
-                          </m:ctrlPr>
-                        </m:sSubPr>
-                        <m:e>
-                          <m:r>
-                            <a:rPr lang="tr-TR" b="0" i="1" smtClean="0">
-                              <a:latin typeface="Cambria Math" panose="02040503050406030204" pitchFamily="18" charset="0"/>
-                            </a:rPr>
-                            <m:t>𝑓</m:t>
-                          </m:r>
-                        </m:e>
-                        <m:sub>
-                          <m:r>
-                            <a:rPr lang="tr-TR" b="0" i="1" smtClean="0">
-                              <a:latin typeface="Cambria Math" panose="02040503050406030204" pitchFamily="18" charset="0"/>
-                            </a:rPr>
-                            <m:t>1</m:t>
-                          </m:r>
-                        </m:sub>
-                      </m:sSub>
-                      <m:d>
-                        <m:dPr>
-                          <m:ctrlPr>
-                            <a:rPr lang="tr-TR" b="0" i="1" smtClean="0">
-                              <a:latin typeface="Cambria Math" panose="02040503050406030204" pitchFamily="18" charset="0"/>
-                            </a:rPr>
-                          </m:ctrlPr>
-                        </m:dPr>
-                        <m:e>
-                          <m:r>
-                            <a:rPr lang="tr-TR" b="0" i="1" smtClean="0">
-                              <a:latin typeface="Cambria Math" panose="02040503050406030204" pitchFamily="18" charset="0"/>
-                            </a:rPr>
-                            <m:t>𝑘</m:t>
-                          </m:r>
-                          <m:r>
-                            <a:rPr lang="tr-TR" b="0" i="1" smtClean="0">
-                              <a:latin typeface="Cambria Math" panose="02040503050406030204" pitchFamily="18" charset="0"/>
-                            </a:rPr>
-                            <m:t>,</m:t>
-                          </m:r>
-                          <m:r>
-                            <a:rPr lang="tr-TR" b="0" i="1" smtClean="0">
-                              <a:latin typeface="Cambria Math" panose="02040503050406030204" pitchFamily="18" charset="0"/>
-                            </a:rPr>
-                            <m:t>𝑔</m:t>
-                          </m:r>
-                          <m:r>
-                            <a:rPr lang="tr-TR" b="0" i="1" smtClean="0">
-                              <a:latin typeface="Cambria Math" panose="02040503050406030204" pitchFamily="18" charset="0"/>
-                            </a:rPr>
-                            <m:t>,</m:t>
-                          </m:r>
-                          <m:sSub>
-                            <m:sSubPr>
-                              <m:ctrlPr>
-                                <a:rPr lang="tr-TR" b="0" i="1" smtClean="0">
-                                  <a:latin typeface="Cambria Math" panose="02040503050406030204" pitchFamily="18" charset="0"/>
-                                </a:rPr>
-                              </m:ctrlPr>
-                            </m:sSubPr>
-                            <m:e>
-                              <m:r>
-                                <a:rPr lang="tr-TR" b="0" i="1" smtClean="0">
-                                  <a:latin typeface="Cambria Math" panose="02040503050406030204" pitchFamily="18" charset="0"/>
-                                </a:rPr>
-                                <m:t>𝐿</m:t>
-                              </m:r>
-                            </m:e>
-                            <m:sub>
-                              <m:r>
-                                <a:rPr lang="tr-TR" b="0" i="1" smtClean="0">
-                                  <a:latin typeface="Cambria Math" panose="02040503050406030204" pitchFamily="18" charset="0"/>
-                                </a:rPr>
-                                <m:t>𝑠</m:t>
-                              </m:r>
-                            </m:sub>
-                          </m:sSub>
-                          <m:r>
-                            <a:rPr lang="tr-TR" b="0" i="1" smtClean="0">
-                              <a:latin typeface="Cambria Math" panose="02040503050406030204" pitchFamily="18" charset="0"/>
-                            </a:rPr>
-                            <m:t>,</m:t>
-                          </m:r>
-                          <m:sSub>
-                            <m:sSubPr>
-                              <m:ctrlPr>
-                                <a:rPr lang="tr-TR" b="0" i="1" smtClean="0">
-                                  <a:latin typeface="Cambria Math" panose="02040503050406030204" pitchFamily="18" charset="0"/>
-                                </a:rPr>
-                              </m:ctrlPr>
-                            </m:sSubPr>
-                            <m:e>
-                              <m:r>
-                                <a:rPr lang="tr-TR" b="0" i="1" smtClean="0">
-                                  <a:latin typeface="Cambria Math" panose="02040503050406030204" pitchFamily="18" charset="0"/>
-                                </a:rPr>
-                                <m:t>𝑏</m:t>
-                              </m:r>
-                            </m:e>
-                            <m:sub>
-                              <m:r>
-                                <a:rPr lang="tr-TR" b="0" i="1" smtClean="0">
-                                  <a:latin typeface="Cambria Math" panose="02040503050406030204" pitchFamily="18" charset="0"/>
-                                </a:rPr>
-                                <m:t>2</m:t>
-                              </m:r>
-                            </m:sub>
-                          </m:sSub>
-                          <m:r>
-                            <a:rPr lang="tr-TR" b="0" i="1" smtClean="0">
-                              <a:latin typeface="Cambria Math" panose="02040503050406030204" pitchFamily="18" charset="0"/>
-                            </a:rPr>
-                            <m:t>,</m:t>
-                          </m:r>
-                          <m:sSub>
-                            <m:sSubPr>
-                              <m:ctrlPr>
-                                <a:rPr lang="tr-TR" b="0" i="1" smtClean="0">
-                                  <a:latin typeface="Cambria Math" panose="02040503050406030204" pitchFamily="18" charset="0"/>
-                                </a:rPr>
-                              </m:ctrlPr>
-                            </m:sSubPr>
-                            <m:e>
-                              <m:r>
-                                <a:rPr lang="tr-TR" b="0" i="1" smtClean="0">
-                                  <a:latin typeface="Cambria Math" panose="02040503050406030204" pitchFamily="18" charset="0"/>
-                                </a:rPr>
-                                <m:t>h</m:t>
-                              </m:r>
-                            </m:e>
-                            <m:sub>
-                              <m:r>
-                                <a:rPr lang="tr-TR" b="0" i="1" smtClean="0">
-                                  <a:latin typeface="Cambria Math" panose="02040503050406030204" pitchFamily="18" charset="0"/>
-                                </a:rPr>
-                                <m:t>2</m:t>
-                              </m:r>
-                            </m:sub>
-                          </m:sSub>
-                        </m:e>
-                      </m:d>
-                      <m:r>
-                        <a:rPr lang="tr-TR" b="0" i="1" smtClean="0">
-                          <a:latin typeface="Cambria Math" panose="02040503050406030204" pitchFamily="18" charset="0"/>
-                        </a:rPr>
-                        <m:t>=</m:t>
-                      </m:r>
-                      <m:r>
-                        <m:rPr>
-                          <m:sty m:val="p"/>
-                        </m:rPr>
-                        <a:rPr lang="el-GR" b="0" i="1" smtClean="0">
-                          <a:latin typeface="Cambria Math" panose="02040503050406030204" pitchFamily="18" charset="0"/>
-                        </a:rPr>
-                        <m:t>η</m:t>
-                      </m:r>
-                      <m:r>
-                        <a:rPr lang="tr-TR" b="0" i="1" smtClean="0">
-                          <a:latin typeface="Cambria Math" panose="02040503050406030204" pitchFamily="18" charset="0"/>
-                        </a:rPr>
-                        <m:t>=</m:t>
-                      </m:r>
-                      <m:f>
-                        <m:fPr>
-                          <m:ctrlPr>
-                            <a:rPr lang="tr-TR" b="0" i="1" smtClean="0">
-                              <a:latin typeface="Cambria Math" panose="02040503050406030204" pitchFamily="18" charset="0"/>
-                            </a:rPr>
-                          </m:ctrlPr>
-                        </m:fPr>
-                        <m:num>
-                          <m:sSub>
-                            <m:sSubPr>
-                              <m:ctrlPr>
-                                <a:rPr lang="tr-TR" b="0" i="1" smtClean="0">
-                                  <a:latin typeface="Cambria Math" panose="02040503050406030204" pitchFamily="18" charset="0"/>
-                                </a:rPr>
-                              </m:ctrlPr>
-                            </m:sSubPr>
-                            <m:e>
-                              <m:r>
-                                <a:rPr lang="tr-TR" b="0" i="1" smtClean="0">
-                                  <a:latin typeface="Cambria Math" panose="02040503050406030204" pitchFamily="18" charset="0"/>
-                                </a:rPr>
-                                <m:t>𝑃</m:t>
-                              </m:r>
-                            </m:e>
-                            <m:sub>
-                              <m:r>
-                                <a:rPr lang="tr-TR" b="0" i="1" smtClean="0">
-                                  <a:latin typeface="Cambria Math" panose="02040503050406030204" pitchFamily="18" charset="0"/>
-                                </a:rPr>
-                                <m:t>𝑜𝑢𝑡</m:t>
-                              </m:r>
-                            </m:sub>
-                          </m:sSub>
-                        </m:num>
-                        <m:den>
-                          <m:sSub>
-                            <m:sSubPr>
-                              <m:ctrlPr>
-                                <a:rPr lang="tr-TR" b="0" i="1" smtClean="0">
-                                  <a:latin typeface="Cambria Math" panose="02040503050406030204" pitchFamily="18" charset="0"/>
-                                </a:rPr>
-                              </m:ctrlPr>
-                            </m:sSubPr>
-                            <m:e>
-                              <m:r>
-                                <a:rPr lang="tr-TR" b="0" i="1" smtClean="0">
-                                  <a:latin typeface="Cambria Math" panose="02040503050406030204" pitchFamily="18" charset="0"/>
-                                </a:rPr>
-                                <m:t>𝑃</m:t>
-                              </m:r>
-                            </m:e>
-                            <m:sub>
-                              <m:r>
-                                <a:rPr lang="tr-TR" b="0" i="1" smtClean="0">
-                                  <a:latin typeface="Cambria Math" panose="02040503050406030204" pitchFamily="18" charset="0"/>
-                                </a:rPr>
-                                <m:t>𝑖𝑛</m:t>
-                              </m:r>
-                            </m:sub>
-                          </m:sSub>
-                        </m:den>
-                      </m:f>
-                      <m:r>
-                        <a:rPr lang="tr-TR" b="0" i="1" smtClean="0">
-                          <a:latin typeface="Cambria Math" panose="02040503050406030204" pitchFamily="18" charset="0"/>
-                          <a:ea typeface="Cambria Math" panose="02040503050406030204" pitchFamily="18" charset="0"/>
-                        </a:rPr>
-                        <m:t>×100</m:t>
-                      </m:r>
-                    </m:oMath>
-                  </m:oMathPara>
-                </a14:m>
                 <a:endParaRPr lang="tr-TR" dirty="0"/>
               </a:p>
               <a:p>
@@ -6185,7 +5939,7 @@
             </p:txBody>
           </p:sp>
         </mc:Choice>
-        <mc:Fallback xmlns="">
+        <mc:Fallback>
           <p:sp>
             <p:nvSpPr>
               <p:cNvPr id="3" name="Content Placeholder 2">
@@ -6363,8 +6117,8 @@
           </a:p>
         </p:txBody>
       </p:sp>
-      <mc:AlternateContent xmlns:mc="http://schemas.openxmlformats.org/markup-compatibility/2006" xmlns:a14="http://schemas.microsoft.com/office/drawing/2010/main">
-        <mc:Choice Requires="a14">
+      <mc:AlternateContent xmlns:mc="http://schemas.openxmlformats.org/markup-compatibility/2006">
+        <mc:Choice xmlns:a14="http://schemas.microsoft.com/office/drawing/2010/main" Requires="a14">
           <p:sp>
             <p:nvSpPr>
               <p:cNvPr id="3" name="Content Placeholder 2">
@@ -6682,6 +6436,18 @@
                               </m:r>
                             </m:sub>
                           </m:sSub>
+                          <m:r>
+                            <a:rPr lang="tr-TR" b="0" i="1" smtClean="0">
+                              <a:latin typeface="Cambria Math" panose="02040503050406030204" pitchFamily="18" charset="0"/>
+                            </a:rPr>
+                            <m:t>,</m:t>
+                          </m:r>
+                          <m:r>
+                            <a:rPr lang="tr-TR" b="0" i="1" smtClean="0">
+                              <a:latin typeface="Cambria Math" panose="02040503050406030204" pitchFamily="18" charset="0"/>
+                            </a:rPr>
+                            <m:t>𝑄</m:t>
+                          </m:r>
                         </m:e>
                       </m:d>
                       <m:r>
@@ -6979,7 +6745,7 @@
             </p:txBody>
           </p:sp>
         </mc:Choice>
-        <mc:Fallback xmlns="">
+        <mc:Fallback>
           <p:sp>
             <p:nvSpPr>
               <p:cNvPr id="3" name="Content Placeholder 2">
@@ -11475,8 +11241,8 @@
           </a:p>
         </p:txBody>
       </p:sp>
-      <mc:AlternateContent xmlns:mc="http://schemas.openxmlformats.org/markup-compatibility/2006" xmlns:a14="http://schemas.microsoft.com/office/drawing/2010/main">
-        <mc:Choice Requires="a14">
+      <mc:AlternateContent xmlns:mc="http://schemas.openxmlformats.org/markup-compatibility/2006">
+        <mc:Choice xmlns:a14="http://schemas.microsoft.com/office/drawing/2010/main" Requires="a14">
           <p:sp>
             <p:nvSpPr>
               <p:cNvPr id="3" name="Content Placeholder 2">
@@ -11850,15 +11616,7 @@
                 </a:r>
                 <a:r>
                   <a:rPr lang="tr-TR" dirty="0" err="1"/>
-                  <a:t>dominated</a:t>
-                </a:r>
-                <a:r>
-                  <a:rPr lang="tr-TR" dirty="0"/>
-                  <a:t> </a:t>
-                </a:r>
-                <a:r>
-                  <a:rPr lang="tr-TR" dirty="0" err="1"/>
-                  <a:t>by</a:t>
+                  <a:t>dominating</a:t>
                 </a:r>
                 <a:r>
                   <a:rPr lang="tr-TR" dirty="0"/>
@@ -11919,7 +11677,7 @@
             </p:txBody>
           </p:sp>
         </mc:Choice>
-        <mc:Fallback xmlns="">
+        <mc:Fallback>
           <p:sp>
             <p:nvSpPr>
               <p:cNvPr id="3" name="Content Placeholder 2">

</xml_diff>